<commit_message>
1 Removed console application. 2 Changed the  namespace name.
</commit_message>
<xml_diff>
--- a/Documents/Workflow Management Management Library.pptx
+++ b/Documents/Workflow Management Management Library.pptx
@@ -113,6 +113,11 @@
       </a:defRPr>
     </a:lvl9pPr>
   </p:defaultTextStyle>
+  <p:extLst>
+    <p:ext uri="{EFAFB233-063F-42B5-8137-9DF3F51BA10A}">
+      <p15:sldGuideLst xmlns:p15="http://schemas.microsoft.com/office/powerpoint/2012/main"/>
+    </p:ext>
+  </p:extLst>
 </p:presentation>
 </file>
 
@@ -838,7 +843,7 @@
           <a:p>
             <a:fld id="{36FA8666-55D6-4DBD-A037-4ED76EE830E3}" type="datetimeFigureOut">
               <a:rPr lang="en-US" smtClean="0"/>
-              <a:t>12/10/2021</a:t>
+              <a:t>2/17/2022</a:t>
             </a:fld>
             <a:endParaRPr lang="en-US"/>
           </a:p>
@@ -1089,7 +1094,7 @@
           <a:p>
             <a:fld id="{36FA8666-55D6-4DBD-A037-4ED76EE830E3}" type="datetimeFigureOut">
               <a:rPr lang="en-US" smtClean="0"/>
-              <a:t>12/10/2021</a:t>
+              <a:t>2/17/2022</a:t>
             </a:fld>
             <a:endParaRPr lang="en-US"/>
           </a:p>
@@ -1403,7 +1408,7 @@
           <a:p>
             <a:fld id="{36FA8666-55D6-4DBD-A037-4ED76EE830E3}" type="datetimeFigureOut">
               <a:rPr lang="en-US" smtClean="0"/>
-              <a:t>12/10/2021</a:t>
+              <a:t>2/17/2022</a:t>
             </a:fld>
             <a:endParaRPr lang="en-US"/>
           </a:p>
@@ -1744,7 +1749,7 @@
           <a:p>
             <a:fld id="{36FA8666-55D6-4DBD-A037-4ED76EE830E3}" type="datetimeFigureOut">
               <a:rPr lang="en-US" smtClean="0"/>
-              <a:t>12/10/2021</a:t>
+              <a:t>2/17/2022</a:t>
             </a:fld>
             <a:endParaRPr lang="en-US"/>
           </a:p>
@@ -2058,7 +2063,7 @@
           <a:p>
             <a:fld id="{36FA8666-55D6-4DBD-A037-4ED76EE830E3}" type="datetimeFigureOut">
               <a:rPr lang="en-US" smtClean="0"/>
-              <a:t>12/10/2021</a:t>
+              <a:t>2/17/2022</a:t>
             </a:fld>
             <a:endParaRPr lang="en-US"/>
           </a:p>
@@ -2451,7 +2456,7 @@
           <a:p>
             <a:fld id="{36FA8666-55D6-4DBD-A037-4ED76EE830E3}" type="datetimeFigureOut">
               <a:rPr lang="en-US" smtClean="0"/>
-              <a:t>12/10/2021</a:t>
+              <a:t>2/17/2022</a:t>
             </a:fld>
             <a:endParaRPr lang="en-US"/>
           </a:p>
@@ -2621,7 +2626,7 @@
           <a:p>
             <a:fld id="{36FA8666-55D6-4DBD-A037-4ED76EE830E3}" type="datetimeFigureOut">
               <a:rPr lang="en-US" smtClean="0"/>
-              <a:t>12/10/2021</a:t>
+              <a:t>2/17/2022</a:t>
             </a:fld>
             <a:endParaRPr lang="en-US"/>
           </a:p>
@@ -2801,7 +2806,7 @@
           <a:p>
             <a:fld id="{36FA8666-55D6-4DBD-A037-4ED76EE830E3}" type="datetimeFigureOut">
               <a:rPr lang="en-US" smtClean="0"/>
-              <a:t>12/10/2021</a:t>
+              <a:t>2/17/2022</a:t>
             </a:fld>
             <a:endParaRPr lang="en-US"/>
           </a:p>
@@ -2977,7 +2982,7 @@
           <a:p>
             <a:fld id="{36FA8666-55D6-4DBD-A037-4ED76EE830E3}" type="datetimeFigureOut">
               <a:rPr lang="en-US" smtClean="0"/>
-              <a:t>12/10/2021</a:t>
+              <a:t>2/17/2022</a:t>
             </a:fld>
             <a:endParaRPr lang="en-US"/>
           </a:p>
@@ -3224,7 +3229,7 @@
           <a:p>
             <a:fld id="{36FA8666-55D6-4DBD-A037-4ED76EE830E3}" type="datetimeFigureOut">
               <a:rPr lang="en-US" smtClean="0"/>
-              <a:t>12/10/2021</a:t>
+              <a:t>2/17/2022</a:t>
             </a:fld>
             <a:endParaRPr lang="en-US"/>
           </a:p>
@@ -3456,7 +3461,7 @@
           <a:p>
             <a:fld id="{36FA8666-55D6-4DBD-A037-4ED76EE830E3}" type="datetimeFigureOut">
               <a:rPr lang="en-US" smtClean="0"/>
-              <a:t>12/10/2021</a:t>
+              <a:t>2/17/2022</a:t>
             </a:fld>
             <a:endParaRPr lang="en-US"/>
           </a:p>
@@ -3830,7 +3835,7 @@
           <a:p>
             <a:fld id="{36FA8666-55D6-4DBD-A037-4ED76EE830E3}" type="datetimeFigureOut">
               <a:rPr lang="en-US" smtClean="0"/>
-              <a:t>12/10/2021</a:t>
+              <a:t>2/17/2022</a:t>
             </a:fld>
             <a:endParaRPr lang="en-US"/>
           </a:p>
@@ -3953,7 +3958,7 @@
           <a:p>
             <a:fld id="{36FA8666-55D6-4DBD-A037-4ED76EE830E3}" type="datetimeFigureOut">
               <a:rPr lang="en-US" smtClean="0"/>
-              <a:t>12/10/2021</a:t>
+              <a:t>2/17/2022</a:t>
             </a:fld>
             <a:endParaRPr lang="en-US"/>
           </a:p>
@@ -4048,7 +4053,7 @@
           <a:p>
             <a:fld id="{36FA8666-55D6-4DBD-A037-4ED76EE830E3}" type="datetimeFigureOut">
               <a:rPr lang="en-US" smtClean="0"/>
-              <a:t>12/10/2021</a:t>
+              <a:t>2/17/2022</a:t>
             </a:fld>
             <a:endParaRPr lang="en-US"/>
           </a:p>
@@ -4303,7 +4308,7 @@
           <a:p>
             <a:fld id="{36FA8666-55D6-4DBD-A037-4ED76EE830E3}" type="datetimeFigureOut">
               <a:rPr lang="en-US" smtClean="0"/>
-              <a:t>12/10/2021</a:t>
+              <a:t>2/17/2022</a:t>
             </a:fld>
             <a:endParaRPr lang="en-US"/>
           </a:p>
@@ -4566,7 +4571,7 @@
           <a:p>
             <a:fld id="{36FA8666-55D6-4DBD-A037-4ED76EE830E3}" type="datetimeFigureOut">
               <a:rPr lang="en-US" smtClean="0"/>
-              <a:t>12/10/2021</a:t>
+              <a:t>2/17/2022</a:t>
             </a:fld>
             <a:endParaRPr lang="en-US"/>
           </a:p>
@@ -5309,7 +5314,7 @@
           <a:p>
             <a:fld id="{36FA8666-55D6-4DBD-A037-4ED76EE830E3}" type="datetimeFigureOut">
               <a:rPr lang="en-US" smtClean="0"/>
-              <a:t>12/10/2021</a:t>
+              <a:t>2/17/2022</a:t>
             </a:fld>
             <a:endParaRPr lang="en-US"/>
           </a:p>
@@ -5892,6 +5897,14 @@
           <a:bodyPr/>
           <a:lstStyle/>
           <a:p>
+            <a:r>
+              <a:rPr lang="en-US"/>
+              <a:t>R</a:t>
+            </a:r>
+            <a:r>
+              <a:rPr lang="en-US" altLang="zh-CN"/>
+              <a:t>ex</a:t>
+            </a:r>
             <a:endParaRPr lang="en-US" dirty="0"/>
           </a:p>
         </p:txBody>
@@ -5940,8 +5953,8 @@
         </p:nvSpPr>
         <p:spPr>
           <a:xfrm>
-            <a:off x="3666477" y="2423604"/>
-            <a:ext cx="4092606" cy="1569660"/>
+            <a:off x="3417902" y="2343705"/>
+            <a:ext cx="4696288" cy="1569660"/>
           </a:xfrm>
           <a:prstGeom prst="rect">
             <a:avLst/>
@@ -5962,7 +5975,7 @@
                   </a:schemeClr>
                 </a:solidFill>
               </a:rPr>
-              <a:t>Thanks</a:t>
+              <a:t>Thanks!</a:t>
             </a:r>
           </a:p>
         </p:txBody>
@@ -6232,7 +6245,27 @@
                 <a:effectLst/>
                 <a:latin typeface="-apple-system"/>
               </a:rPr>
-              <a:t>Clean the redundant "if ... else..."</a:t>
+              <a:t>R</a:t>
+            </a:r>
+            <a:r>
+              <a:rPr lang="en-US" altLang="zh-CN" b="0" i="0" dirty="0">
+                <a:solidFill>
+                  <a:srgbClr val="24292F"/>
+                </a:solidFill>
+                <a:effectLst/>
+                <a:latin typeface="-apple-system"/>
+              </a:rPr>
+              <a:t>educe</a:t>
+            </a:r>
+            <a:r>
+              <a:rPr lang="en-US" b="0" i="0" dirty="0">
+                <a:solidFill>
+                  <a:srgbClr val="24292F"/>
+                </a:solidFill>
+                <a:effectLst/>
+                <a:latin typeface="-apple-system"/>
+              </a:rPr>
+              <a:t> the redundant "if ... else..."</a:t>
             </a:r>
           </a:p>
           <a:p>
@@ -6248,7 +6281,7 @@
                 <a:effectLst/>
                 <a:latin typeface="-apple-system"/>
               </a:rPr>
-              <a:t>reduce the maintenance cost for the life cycle</a:t>
+              <a:t>reduce the maintenance cost for the whole life cycle</a:t>
             </a:r>
           </a:p>
           <a:p>
@@ -6541,8 +6574,8 @@
         </p:blipFill>
         <p:spPr>
           <a:xfrm>
-            <a:off x="4496115" y="2846390"/>
-            <a:ext cx="7695885" cy="4011610"/>
+            <a:off x="4939695" y="3077614"/>
+            <a:ext cx="7252305" cy="3780386"/>
           </a:xfrm>
           <a:prstGeom prst="rect">
             <a:avLst/>
@@ -6640,7 +6673,7 @@
         <p:spPr>
           <a:xfrm>
             <a:off x="0" y="580253"/>
-            <a:ext cx="5799741" cy="2515601"/>
+            <a:ext cx="5559783" cy="2411521"/>
           </a:xfrm>
           <a:prstGeom prst="rect">
             <a:avLst/>
@@ -6669,8 +6702,8 @@
         </p:blipFill>
         <p:spPr>
           <a:xfrm>
-            <a:off x="4879910" y="3114438"/>
-            <a:ext cx="7312090" cy="3692243"/>
+            <a:off x="4918288" y="3133818"/>
+            <a:ext cx="7273712" cy="3672864"/>
           </a:xfrm>
           <a:prstGeom prst="rect">
             <a:avLst/>
@@ -6763,7 +6796,7 @@
         </p:blipFill>
         <p:spPr>
           <a:xfrm>
-            <a:off x="1147665" y="716045"/>
+            <a:off x="822502" y="645023"/>
             <a:ext cx="10546994" cy="2370025"/>
           </a:xfrm>
           <a:prstGeom prst="rect">
@@ -6793,8 +6826,8 @@
         </p:blipFill>
         <p:spPr>
           <a:xfrm>
-            <a:off x="2236135" y="3429000"/>
-            <a:ext cx="7719729" cy="2712955"/>
+            <a:off x="1779447" y="3429000"/>
+            <a:ext cx="8633105" cy="3033944"/>
           </a:xfrm>
           <a:prstGeom prst="rect">
             <a:avLst/>
@@ -7018,7 +7051,7 @@
           <a:p>
             <a:r>
               <a:rPr lang="en-US" dirty="0"/>
-              <a:t>Questions: which repo should be used to store the code?</a:t>
+              <a:t>Questions: Which repo should be used to store the code?</a:t>
             </a:r>
           </a:p>
         </p:txBody>

</xml_diff>